<commit_message>
link to harder data sets
</commit_message>
<xml_diff>
--- a/lectures/lec6/lec6.pptx
+++ b/lectures/lec6/lec6.pptx
@@ -140,7 +140,7 @@
               <c:strCache>
                 <c:ptCount val="1"/>
                 <c:pt idx="0">
-                  <c:v>Incorrect Matches</c:v>
+                  <c:v>Matching Pairs</c:v>
                 </c:pt>
               </c:strCache>
             </c:strRef>
@@ -277,115 +277,115 @@
                 <c:formatCode>General</c:formatCode>
                 <c:ptCount val="37"/>
                 <c:pt idx="0">
-                  <c:v>8.923943800563623</c:v>
+                  <c:v>6.933755470391464</c:v>
                 </c:pt>
                 <c:pt idx="1">
-                  <c:v>5.244148114058232</c:v>
+                  <c:v>8.282128931150565</c:v>
                 </c:pt>
                 <c:pt idx="2">
-                  <c:v>6.69345309252607</c:v>
+                  <c:v>6.5396390039313</c:v>
                 </c:pt>
                 <c:pt idx="3">
-                  <c:v>7.013560908130605</c:v>
+                  <c:v>7.99054194600795</c:v>
                 </c:pt>
                 <c:pt idx="4">
-                  <c:v>5.145284554815191</c:v>
+                  <c:v>5.267894738817276</c:v>
                 </c:pt>
                 <c:pt idx="5">
-                  <c:v>9.686514094189904</c:v>
+                  <c:v>6.90314345631907</c:v>
                 </c:pt>
                 <c:pt idx="6">
-                  <c:v>9.867631869801117</c:v>
+                  <c:v>6.974754752370965</c:v>
                 </c:pt>
                 <c:pt idx="7">
-                  <c:v>7.327500631482495</c:v>
+                  <c:v>6.350502507120392</c:v>
                 </c:pt>
                 <c:pt idx="8">
-                  <c:v>6.373329531564303</c:v>
+                  <c:v>7.754527862933512</c:v>
                 </c:pt>
                 <c:pt idx="9">
-                  <c:v>7.840761334240262</c:v>
+                  <c:v>6.724766357751053</c:v>
                 </c:pt>
                 <c:pt idx="10">
-                  <c:v>9.82996191697963</c:v>
+                  <c:v>6.413345842789666</c:v>
                 </c:pt>
                 <c:pt idx="11">
-                  <c:v>5.675290510587413</c:v>
+                  <c:v>9.35606513940584</c:v>
                 </c:pt>
                 <c:pt idx="12">
-                  <c:v>8.164366910912003</c:v>
+                  <c:v>5.167464065596027</c:v>
                 </c:pt>
                 <c:pt idx="13">
-                  <c:v>6.274407894444546</c:v>
+                  <c:v>9.585716378093415</c:v>
                 </c:pt>
                 <c:pt idx="14">
-                  <c:v>9.16935081240799</c:v>
+                  <c:v>9.211153787492643</c:v>
                 </c:pt>
                 <c:pt idx="15">
-                  <c:v>8.85173861399739</c:v>
+                  <c:v>8.795768203167085</c:v>
                 </c:pt>
                 <c:pt idx="16">
-                  <c:v>5.091806776437111</c:v>
+                  <c:v>6.191998128845056</c:v>
                 </c:pt>
                 <c:pt idx="17">
-                  <c:v>7.817658564472504</c:v>
+                  <c:v>7.833136757087149</c:v>
                 </c:pt>
                 <c:pt idx="18">
-                  <c:v>6.472155636043297</c:v>
+                  <c:v>5.111859016541834</c:v>
                 </c:pt>
                 <c:pt idx="19">
-                  <c:v>9.031017329222331</c:v>
+                  <c:v>6.763459194131796</c:v>
                 </c:pt>
                 <c:pt idx="20">
-                  <c:v>9.003793969436966</c:v>
+                  <c:v>8.414946180711038</c:v>
                 </c:pt>
                 <c:pt idx="21">
-                  <c:v>9.500003463969179</c:v>
+                  <c:v>8.059417150851157</c:v>
                 </c:pt>
                 <c:pt idx="22">
-                  <c:v>9.70631551049312</c:v>
+                  <c:v>7.129274535659187</c:v>
                 </c:pt>
                 <c:pt idx="23">
-                  <c:v>9.120355551923886</c:v>
+                  <c:v>8.256693659512155</c:v>
                 </c:pt>
                 <c:pt idx="24">
-                  <c:v>5.899055226779938</c:v>
+                  <c:v>9.60363232671873</c:v>
                 </c:pt>
                 <c:pt idx="25">
-                  <c:v>5.73092352974548</c:v>
+                  <c:v>7.732125903670805</c:v>
                 </c:pt>
                 <c:pt idx="26">
-                  <c:v>5.169584743207593</c:v>
+                  <c:v>9.67876526908461</c:v>
                 </c:pt>
                 <c:pt idx="27">
-                  <c:v>8.61533450869836</c:v>
+                  <c:v>8.320781331838878</c:v>
                 </c:pt>
                 <c:pt idx="28">
-                  <c:v>7.518819232427436</c:v>
+                  <c:v>5.016844018284969</c:v>
                 </c:pt>
                 <c:pt idx="29">
-                  <c:v>9.398663688016903</c:v>
+                  <c:v>9.875276365757503</c:v>
                 </c:pt>
                 <c:pt idx="30">
-                  <c:v>7.570424810199622</c:v>
+                  <c:v>6.047712532331413</c:v>
                 </c:pt>
                 <c:pt idx="31">
-                  <c:v>8.542305171424385</c:v>
+                  <c:v>6.595440285911072</c:v>
                 </c:pt>
                 <c:pt idx="32">
-                  <c:v>8.631232745511431</c:v>
+                  <c:v>9.179174965769075</c:v>
                 </c:pt>
                 <c:pt idx="33">
-                  <c:v>5.346970534688828</c:v>
+                  <c:v>8.839328231714838</c:v>
                 </c:pt>
                 <c:pt idx="34">
-                  <c:v>5.941892496124974</c:v>
+                  <c:v>8.742803405920203</c:v>
                 </c:pt>
                 <c:pt idx="35">
-                  <c:v>6.713409966882023</c:v>
+                  <c:v>7.897336726756269</c:v>
                 </c:pt>
                 <c:pt idx="36">
-                  <c:v>6.658640269148802</c:v>
+                  <c:v>7.172642381561075</c:v>
                 </c:pt>
               </c:numCache>
             </c:numRef>
@@ -401,7 +401,7 @@
               <c:strCache>
                 <c:ptCount val="1"/>
                 <c:pt idx="0">
-                  <c:v>Correct Matches</c:v>
+                  <c:v>Not Matching Pairs</c:v>
                 </c:pt>
               </c:strCache>
             </c:strRef>
@@ -538,115 +538,115 @@
                 <c:formatCode>General</c:formatCode>
                 <c:ptCount val="37"/>
                 <c:pt idx="0">
-                  <c:v>4.353206687174544</c:v>
+                  <c:v>4.307879318710437</c:v>
                 </c:pt>
                 <c:pt idx="1">
-                  <c:v>6.83107049795201</c:v>
+                  <c:v>4.919393439753985</c:v>
                 </c:pt>
                 <c:pt idx="2">
-                  <c:v>4.408164567320163</c:v>
+                  <c:v>2.045700891479254</c:v>
                 </c:pt>
                 <c:pt idx="3">
-                  <c:v>2.983781481017577</c:v>
+                  <c:v>6.970205248255846</c:v>
                 </c:pt>
                 <c:pt idx="4">
-                  <c:v>6.188418978720916</c:v>
+                  <c:v>5.476819853200648</c:v>
                 </c:pt>
                 <c:pt idx="5">
-                  <c:v>5.25147089379148</c:v>
+                  <c:v>6.867694119449692</c:v>
                 </c:pt>
                 <c:pt idx="6">
-                  <c:v>4.641077815626939</c:v>
+                  <c:v>4.29774902255478</c:v>
                 </c:pt>
                 <c:pt idx="7">
-                  <c:v>3.446628208903435</c:v>
+                  <c:v>5.426818338596585</c:v>
                 </c:pt>
                 <c:pt idx="8">
-                  <c:v>4.409426831606973</c:v>
+                  <c:v>5.729608028232485</c:v>
                 </c:pt>
                 <c:pt idx="9">
-                  <c:v>4.99111801586753</c:v>
+                  <c:v>3.262467361697554</c:v>
                 </c:pt>
                 <c:pt idx="10">
-                  <c:v>4.207085940384132</c:v>
+                  <c:v>5.194880887802856</c:v>
                 </c:pt>
                 <c:pt idx="11">
-                  <c:v>6.147218362671817</c:v>
+                  <c:v>6.900203438205391</c:v>
                 </c:pt>
                 <c:pt idx="12">
-                  <c:v>6.996108436962942</c:v>
+                  <c:v>4.049666985749504</c:v>
                 </c:pt>
                 <c:pt idx="13">
-                  <c:v>2.262100649717769</c:v>
+                  <c:v>4.689648235352455</c:v>
                 </c:pt>
                 <c:pt idx="14">
-                  <c:v>6.27933772332486</c:v>
+                  <c:v>6.315933559734167</c:v>
                 </c:pt>
                 <c:pt idx="15">
-                  <c:v>6.22135313483826</c:v>
+                  <c:v>4.646851300559505</c:v>
                 </c:pt>
                 <c:pt idx="16">
-                  <c:v>6.060604742463015</c:v>
+                  <c:v>2.42218721211779</c:v>
                 </c:pt>
                 <c:pt idx="17">
-                  <c:v>6.726707998220451</c:v>
+                  <c:v>3.671192264919201</c:v>
                 </c:pt>
                 <c:pt idx="18">
-                  <c:v>5.50276334201522</c:v>
+                  <c:v>5.454030883287412</c:v>
                 </c:pt>
                 <c:pt idx="19">
-                  <c:v>5.112853461963501</c:v>
+                  <c:v>4.958688310637862</c:v>
                 </c:pt>
                 <c:pt idx="20">
-                  <c:v>3.824586644096515</c:v>
+                  <c:v>3.576644695332874</c:v>
                 </c:pt>
                 <c:pt idx="21">
-                  <c:v>2.111627660945471</c:v>
+                  <c:v>2.50441055228347</c:v>
                 </c:pt>
                 <c:pt idx="22">
-                  <c:v>5.121808166055664</c:v>
+                  <c:v>5.086071654556405</c:v>
                 </c:pt>
                 <c:pt idx="23">
-                  <c:v>2.531315980411645</c:v>
+                  <c:v>5.277411921046967</c:v>
                 </c:pt>
                 <c:pt idx="24">
-                  <c:v>3.283897105449022</c:v>
+                  <c:v>6.909659556602284</c:v>
                 </c:pt>
                 <c:pt idx="25">
-                  <c:v>5.536129277140467</c:v>
+                  <c:v>6.738609822554252</c:v>
                 </c:pt>
                 <c:pt idx="26">
-                  <c:v>6.557653537295165</c:v>
+                  <c:v>2.206411973439948</c:v>
                 </c:pt>
                 <c:pt idx="27">
-                  <c:v>2.088593114285476</c:v>
+                  <c:v>4.428196585382318</c:v>
                 </c:pt>
                 <c:pt idx="28">
-                  <c:v>2.808123363984546</c:v>
+                  <c:v>3.840479761910197</c:v>
                 </c:pt>
                 <c:pt idx="29">
-                  <c:v>2.023961714654136</c:v>
+                  <c:v>2.436490598334319</c:v>
                 </c:pt>
                 <c:pt idx="30">
-                  <c:v>5.560676240275067</c:v>
+                  <c:v>3.18880807751265</c:v>
                 </c:pt>
                 <c:pt idx="31">
-                  <c:v>2.600379536819031</c:v>
+                  <c:v>3.184276046855295</c:v>
                 </c:pt>
                 <c:pt idx="32">
-                  <c:v>5.724814633639927</c:v>
+                  <c:v>2.96328217340767</c:v>
                 </c:pt>
                 <c:pt idx="33">
-                  <c:v>2.080785826869201</c:v>
+                  <c:v>4.815211205998693</c:v>
                 </c:pt>
                 <c:pt idx="34">
-                  <c:v>5.380128893444441</c:v>
+                  <c:v>6.423891902264218</c:v>
                 </c:pt>
                 <c:pt idx="35">
-                  <c:v>3.362346283409603</c:v>
+                  <c:v>4.503728662544828</c:v>
                 </c:pt>
                 <c:pt idx="36">
-                  <c:v>5.38748002032403</c:v>
+                  <c:v>3.832560954567699</c:v>
                 </c:pt>
               </c:numCache>
             </c:numRef>
@@ -8123,6 +8123,13 @@
   <p:clrMapOvr>
     <a:masterClrMapping/>
   </p:clrMapOvr>
+  <p:timing>
+    <p:tnLst>
+      <p:par>
+        <p:cTn xmlns:p14="http://schemas.microsoft.com/office/powerpoint/2010/main" id="1" dur="indefinite" restart="never" nodeType="tmRoot"/>
+      </p:par>
+    </p:tnLst>
+  </p:timing>
 </p:sld>
 </file>
 
@@ -8297,7 +8304,7 @@
           <p:nvPr>
             <p:extLst>
               <p:ext uri="{D42A27DB-BD31-4B8C-83A1-F6EECF244321}">
-                <p14:modId xmlns:p14="http://schemas.microsoft.com/office/powerpoint/2010/main" val="1977454560"/>
+                <p14:modId xmlns:p14="http://schemas.microsoft.com/office/powerpoint/2010/main" val="1895135023"/>
               </p:ext>
             </p:extLst>
           </p:nvPr>
@@ -8310,7 +8317,7 @@
           <a:graphicData uri="http://schemas.openxmlformats.org/presentationml/2006/ole">
             <mc:AlternateContent xmlns:mc="http://schemas.openxmlformats.org/markup-compatibility/2006">
               <mc:Choice xmlns:v="urn:schemas-microsoft-com:vml" Requires="v">
-                <p:oleObj spid="_x0000_s1031" name="Worksheet" r:id="rId3" imgW="15303500" imgH="4965700" progId="Excel.Sheet.12">
+                <p:oleObj spid="_x0000_s1035" name="Worksheet" r:id="rId3" imgW="15303500" imgH="4965700" progId="Excel.Sheet.12">
                   <p:embed/>
                 </p:oleObj>
               </mc:Choice>
@@ -8354,7 +8361,7 @@
           <p:nvPr>
             <p:extLst>
               <p:ext uri="{D42A27DB-BD31-4B8C-83A1-F6EECF244321}">
-                <p14:modId xmlns:p14="http://schemas.microsoft.com/office/powerpoint/2010/main" val="1101482827"/>
+                <p14:modId xmlns:p14="http://schemas.microsoft.com/office/powerpoint/2010/main" val="2444555176"/>
               </p:ext>
             </p:extLst>
           </p:nvPr>
@@ -8367,7 +8374,7 @@
           <a:graphicData uri="http://schemas.openxmlformats.org/presentationml/2006/ole">
             <mc:AlternateContent xmlns:mc="http://schemas.openxmlformats.org/markup-compatibility/2006">
               <mc:Choice xmlns:v="urn:schemas-microsoft-com:vml" Requires="v">
-                <p:oleObj spid="_x0000_s1032" name="Worksheet" r:id="rId5" imgW="13677900" imgH="8775700" progId="Excel.Sheet.12">
+                <p:oleObj spid="_x0000_s1036" name="Worksheet" r:id="rId5" imgW="13677900" imgH="8775700" progId="Excel.Sheet.12">
                   <p:embed/>
                 </p:oleObj>
               </mc:Choice>
@@ -8535,7 +8542,7 @@
           <p:nvPr>
             <p:extLst>
               <p:ext uri="{D42A27DB-BD31-4B8C-83A1-F6EECF244321}">
-                <p14:modId xmlns:p14="http://schemas.microsoft.com/office/powerpoint/2010/main" val="2450040289"/>
+                <p14:modId xmlns:p14="http://schemas.microsoft.com/office/powerpoint/2010/main" val="3627652854"/>
               </p:ext>
             </p:extLst>
           </p:nvPr>
@@ -8595,7 +8602,7 @@
         </p:nvSpPr>
         <p:spPr>
           <a:xfrm>
-            <a:off x="6305176" y="3257177"/>
+            <a:off x="6834094" y="3257177"/>
             <a:ext cx="1852706" cy="646331"/>
           </a:xfrm>
           <a:prstGeom prst="rect">
@@ -8620,6 +8627,118 @@
               <a:t>(score = .6)</a:t>
             </a:r>
             <a:endParaRPr lang="en-US" dirty="0"/>
+          </a:p>
+        </p:txBody>
+      </p:sp>
+      <p:grpSp>
+        <p:nvGrpSpPr>
+          <p:cNvPr id="12" name="Group 11"/>
+          <p:cNvGrpSpPr/>
+          <p:nvPr/>
+        </p:nvGrpSpPr>
+        <p:grpSpPr>
+          <a:xfrm>
+            <a:off x="5767294" y="1748118"/>
+            <a:ext cx="2919506" cy="1389529"/>
+            <a:chOff x="5767294" y="1748118"/>
+            <a:chExt cx="2919506" cy="1389529"/>
+          </a:xfrm>
+        </p:grpSpPr>
+        <p:cxnSp>
+          <p:nvCxnSpPr>
+            <p:cNvPr id="9" name="Straight Arrow Connector 8"/>
+            <p:cNvCxnSpPr/>
+            <p:nvPr/>
+          </p:nvCxnSpPr>
+          <p:spPr>
+            <a:xfrm flipH="1">
+              <a:off x="5767294" y="2166471"/>
+              <a:ext cx="1066800" cy="971176"/>
+            </a:xfrm>
+            <a:prstGeom prst="straightConnector1">
+              <a:avLst/>
+            </a:prstGeom>
+            <a:ln>
+              <a:tailEnd type="arrow"/>
+            </a:ln>
+          </p:spPr>
+          <p:style>
+            <a:lnRef idx="2">
+              <a:schemeClr val="accent1"/>
+            </a:lnRef>
+            <a:fillRef idx="0">
+              <a:schemeClr val="accent1"/>
+            </a:fillRef>
+            <a:effectRef idx="1">
+              <a:schemeClr val="accent1"/>
+            </a:effectRef>
+            <a:fontRef idx="minor">
+              <a:schemeClr val="tx1"/>
+            </a:fontRef>
+          </p:style>
+        </p:cxnSp>
+        <p:sp>
+          <p:nvSpPr>
+            <p:cNvPr id="10" name="TextBox 9"/>
+            <p:cNvSpPr txBox="1"/>
+            <p:nvPr/>
+          </p:nvSpPr>
+          <p:spPr>
+            <a:xfrm>
+              <a:off x="7007412" y="1748118"/>
+              <a:ext cx="1679388" cy="646331"/>
+            </a:xfrm>
+            <a:prstGeom prst="rect">
+              <a:avLst/>
+            </a:prstGeom>
+            <a:noFill/>
+          </p:spPr>
+          <p:txBody>
+            <a:bodyPr wrap="square" rtlCol="0">
+              <a:spAutoFit/>
+            </a:bodyPr>
+            <a:lstStyle/>
+            <a:p>
+              <a:r>
+                <a:rPr lang="en-US" dirty="0" smtClean="0"/>
+                <a:t>Pairs of entities</a:t>
+              </a:r>
+            </a:p>
+            <a:p>
+              <a:r>
+                <a:rPr lang="en-US" dirty="0" smtClean="0"/>
+                <a:t>(E1,E2)</a:t>
+              </a:r>
+              <a:endParaRPr lang="en-US" dirty="0"/>
+            </a:p>
+          </p:txBody>
+        </p:sp>
+      </p:grpSp>
+      <p:sp>
+        <p:nvSpPr>
+          <p:cNvPr id="11" name="Rectangle 10"/>
+          <p:cNvSpPr/>
+          <p:nvPr/>
+        </p:nvSpPr>
+        <p:spPr>
+          <a:xfrm>
+            <a:off x="6709893" y="4349981"/>
+            <a:ext cx="2434107" cy="1200329"/>
+          </a:xfrm>
+          <a:prstGeom prst="rect">
+            <a:avLst/>
+          </a:prstGeom>
+        </p:spPr>
+        <p:txBody>
+          <a:bodyPr wrap="square">
+            <a:spAutoFit/>
+          </a:bodyPr>
+          <a:lstStyle/>
+          <a:p>
+            <a:r>
+              <a:rPr lang="en-US" dirty="0" smtClean="0"/>
+              <a:t>Definition of “best”: minimizes entropy of labels of points above/below separators</a:t>
+            </a:r>
           </a:p>
         </p:txBody>
       </p:sp>
@@ -8654,7 +8773,7 @@
                             </p:stCondLst>
                             <p:childTnLst>
                               <p:par>
-                                <p:cTn id="5" presetID="22" presetClass="entr" presetSubtype="8" fill="hold" nodeType="clickEffect">
+                                <p:cTn id="5" presetID="1" presetClass="entr" presetSubtype="0" fill="hold" nodeType="clickEffect">
                                   <p:stCondLst>
                                     <p:cond delay="0"/>
                                   </p:stCondLst>
@@ -8662,6 +8781,51 @@
                                     <p:set>
                                       <p:cBhvr>
                                         <p:cTn id="6" dur="1" fill="hold">
+                                          <p:stCondLst>
+                                            <p:cond delay="0"/>
+                                          </p:stCondLst>
+                                        </p:cTn>
+                                        <p:tgtEl>
+                                          <p:spTgt spid="12"/>
+                                        </p:tgtEl>
+                                        <p:attrNameLst>
+                                          <p:attrName>style.visibility</p:attrName>
+                                        </p:attrNameLst>
+                                      </p:cBhvr>
+                                      <p:to>
+                                        <p:strVal val="visible"/>
+                                      </p:to>
+                                    </p:set>
+                                  </p:childTnLst>
+                                </p:cTn>
+                              </p:par>
+                            </p:childTnLst>
+                          </p:cTn>
+                        </p:par>
+                      </p:childTnLst>
+                    </p:cTn>
+                  </p:par>
+                  <p:par>
+                    <p:cTn id="7" fill="hold">
+                      <p:stCondLst>
+                        <p:cond delay="indefinite"/>
+                      </p:stCondLst>
+                      <p:childTnLst>
+                        <p:par>
+                          <p:cTn id="8" fill="hold">
+                            <p:stCondLst>
+                              <p:cond delay="0"/>
+                            </p:stCondLst>
+                            <p:childTnLst>
+                              <p:par>
+                                <p:cTn id="9" presetID="22" presetClass="entr" presetSubtype="8" fill="hold" nodeType="clickEffect">
+                                  <p:stCondLst>
+                                    <p:cond delay="0"/>
+                                  </p:stCondLst>
+                                  <p:childTnLst>
+                                    <p:set>
+                                      <p:cBhvr>
+                                        <p:cTn id="10" dur="1" fill="hold">
                                           <p:stCondLst>
                                             <p:cond delay="0"/>
                                           </p:stCondLst>
@@ -8679,7 +8843,7 @@
                                     </p:set>
                                     <p:animEffect transition="in" filter="wipe(left)">
                                       <p:cBhvr>
-                                        <p:cTn id="7" dur="500"/>
+                                        <p:cTn id="11" dur="500"/>
                                         <p:tgtEl>
                                           <p:spTgt spid="6"/>
                                         </p:tgtEl>
@@ -8695,32 +8859,77 @@
                     </p:cTn>
                   </p:par>
                   <p:par>
-                    <p:cTn id="8" fill="hold">
+                    <p:cTn id="12" fill="hold">
                       <p:stCondLst>
                         <p:cond delay="indefinite"/>
                       </p:stCondLst>
                       <p:childTnLst>
                         <p:par>
-                          <p:cTn id="9" fill="hold">
+                          <p:cTn id="13" fill="hold">
                             <p:stCondLst>
                               <p:cond delay="0"/>
                             </p:stCondLst>
                             <p:childTnLst>
                               <p:par>
-                                <p:cTn id="10" presetID="1" presetClass="entr" presetSubtype="0" fill="hold" grpId="0" nodeType="clickEffect">
+                                <p:cTn id="14" presetID="1" presetClass="entr" presetSubtype="0" fill="hold" grpId="0" nodeType="clickEffect">
                                   <p:stCondLst>
                                     <p:cond delay="0"/>
                                   </p:stCondLst>
                                   <p:childTnLst>
                                     <p:set>
                                       <p:cBhvr>
-                                        <p:cTn id="11" dur="1" fill="hold">
+                                        <p:cTn id="15" dur="1" fill="hold">
                                           <p:stCondLst>
                                             <p:cond delay="0"/>
                                           </p:stCondLst>
                                         </p:cTn>
                                         <p:tgtEl>
                                           <p:spTgt spid="7"/>
+                                        </p:tgtEl>
+                                        <p:attrNameLst>
+                                          <p:attrName>style.visibility</p:attrName>
+                                        </p:attrNameLst>
+                                      </p:cBhvr>
+                                      <p:to>
+                                        <p:strVal val="visible"/>
+                                      </p:to>
+                                    </p:set>
+                                  </p:childTnLst>
+                                </p:cTn>
+                              </p:par>
+                            </p:childTnLst>
+                          </p:cTn>
+                        </p:par>
+                      </p:childTnLst>
+                    </p:cTn>
+                  </p:par>
+                  <p:par>
+                    <p:cTn id="16" fill="hold">
+                      <p:stCondLst>
+                        <p:cond delay="indefinite"/>
+                      </p:stCondLst>
+                      <p:childTnLst>
+                        <p:par>
+                          <p:cTn id="17" fill="hold">
+                            <p:stCondLst>
+                              <p:cond delay="0"/>
+                            </p:stCondLst>
+                            <p:childTnLst>
+                              <p:par>
+                                <p:cTn id="18" presetID="1" presetClass="entr" presetSubtype="0" fill="hold" grpId="0" nodeType="clickEffect">
+                                  <p:stCondLst>
+                                    <p:cond delay="0"/>
+                                  </p:stCondLst>
+                                  <p:childTnLst>
+                                    <p:set>
+                                      <p:cBhvr>
+                                        <p:cTn id="19" dur="1" fill="hold">
+                                          <p:stCondLst>
+                                            <p:cond delay="0"/>
+                                          </p:stCondLst>
+                                        </p:cTn>
+                                        <p:tgtEl>
+                                          <p:spTgt spid="11"/>
                                         </p:tgtEl>
                                         <p:attrNameLst>
                                           <p:attrName>style.visibility</p:attrName>
@@ -8762,6 +8971,7 @@
     </p:tnLst>
     <p:bldLst>
       <p:bldP spid="7" grpId="0"/>
+      <p:bldP spid="11" grpId="0"/>
     </p:bldLst>
   </p:timing>
 </p:sld>
@@ -8829,6 +9039,47 @@
           </a:graphicData>
         </a:graphic>
       </p:graphicFrame>
+      <p:sp>
+        <p:nvSpPr>
+          <p:cNvPr id="5" name="Rectangle 4"/>
+          <p:cNvSpPr/>
+          <p:nvPr/>
+        </p:nvSpPr>
+        <p:spPr>
+          <a:xfrm>
+            <a:off x="2286000" y="5461000"/>
+            <a:ext cx="4572000" cy="923330"/>
+          </a:xfrm>
+          <a:prstGeom prst="rect">
+            <a:avLst/>
+          </a:prstGeom>
+        </p:spPr>
+        <p:txBody>
+          <a:bodyPr>
+            <a:spAutoFit/>
+          </a:bodyPr>
+          <a:lstStyle/>
+          <a:p>
+            <a:r>
+              <a:rPr lang="en-US" dirty="0" smtClean="0"/>
+              <a:t>Recursively subdivide </a:t>
+            </a:r>
+            <a:r>
+              <a:rPr lang="en-US" dirty="0" smtClean="0"/>
+              <a:t>each group of points, find separator for each subgroup, and </a:t>
+            </a:r>
+            <a:r>
+              <a:rPr lang="en-US" dirty="0" err="1" smtClean="0"/>
+              <a:t>recurse</a:t>
+            </a:r>
+            <a:r>
+              <a:rPr lang="en-US" dirty="0" smtClean="0"/>
+              <a:t> again…</a:t>
+            </a:r>
+            <a:endParaRPr lang="en-US" dirty="0" smtClean="0"/>
+          </a:p>
+        </p:txBody>
+      </p:sp>
     </p:spTree>
     <p:extLst>
       <p:ext uri="{BB962C8B-B14F-4D97-AF65-F5344CB8AC3E}">

</xml_diff>